<commit_message>
update presentations for day 1
</commit_message>
<xml_diff>
--- a/files/msse-intro.pptx
+++ b/files/msse-intro.pptx
@@ -5,10 +5,10 @@
     <p:sldMasterId id="2147483672" r:id="rId1"/>
   </p:sldMasterIdLst>
   <p:notesMasterIdLst>
-    <p:notesMasterId r:id="rId11"/>
+    <p:notesMasterId r:id="rId14"/>
   </p:notesMasterIdLst>
   <p:handoutMasterIdLst>
-    <p:handoutMasterId r:id="rId12"/>
+    <p:handoutMasterId r:id="rId15"/>
   </p:handoutMasterIdLst>
   <p:sldIdLst>
     <p:sldId id="265" r:id="rId2"/>
@@ -17,14 +17,17 @@
     <p:sldId id="326" r:id="rId5"/>
     <p:sldId id="332" r:id="rId6"/>
     <p:sldId id="336" r:id="rId7"/>
-    <p:sldId id="337" r:id="rId8"/>
-    <p:sldId id="338" r:id="rId9"/>
-    <p:sldId id="339" r:id="rId10"/>
+    <p:sldId id="340" r:id="rId8"/>
+    <p:sldId id="337" r:id="rId9"/>
+    <p:sldId id="341" r:id="rId10"/>
+    <p:sldId id="342" r:id="rId11"/>
+    <p:sldId id="338" r:id="rId12"/>
+    <p:sldId id="339" r:id="rId13"/>
   </p:sldIdLst>
   <p:sldSz cx="12192000" cy="6858000"/>
   <p:notesSz cx="6858000" cy="9144000"/>
   <p:custDataLst>
-    <p:tags r:id="rId13"/>
+    <p:tags r:id="rId16"/>
   </p:custDataLst>
   <p:defaultTextStyle>
     <a:defPPr>
@@ -245,7 +248,7 @@
               <a:rPr lang="en-US" smtClean="0">
                 <a:latin typeface="Lucida Grande Regular" panose="020B0600040502020204" pitchFamily="34" charset="0"/>
               </a:rPr>
-              <a:t>8/8/2021</a:t>
+              <a:t>8/7/2022</a:t>
             </a:fld>
             <a:endParaRPr lang="en-US" dirty="0">
               <a:latin typeface="Lucida Grande Regular" panose="020B0600040502020204" pitchFamily="34" charset="0"/>
@@ -424,7 +427,7 @@
             <a:fld id="{5F53F6BF-7462-9046-A2B6-90C29244BD27}" type="datetimeFigureOut">
               <a:rPr lang="en-US" smtClean="0"/>
               <a:pPr/>
-              <a:t>8/8/2021</a:t>
+              <a:t>8/7/2022</a:t>
             </a:fld>
             <a:endParaRPr lang="en-US" dirty="0"/>
           </a:p>
@@ -787,6 +790,276 @@
 </p:notes>
 </file>
 
+<file path=ppt/notesSlides/notesSlide10.xml><?xml version="1.0" encoding="utf-8"?>
+<p:notes xmlns:a="http://schemas.openxmlformats.org/drawingml/2006/main" xmlns:r="http://schemas.openxmlformats.org/officeDocument/2006/relationships" xmlns:p="http://schemas.openxmlformats.org/presentationml/2006/main">
+  <p:cSld>
+    <p:spTree>
+      <p:nvGrpSpPr>
+        <p:cNvPr id="1" name=""/>
+        <p:cNvGrpSpPr/>
+        <p:nvPr/>
+      </p:nvGrpSpPr>
+      <p:grpSpPr>
+        <a:xfrm>
+          <a:off x="0" y="0"/>
+          <a:ext cx="0" cy="0"/>
+          <a:chOff x="0" y="0"/>
+          <a:chExt cx="0" cy="0"/>
+        </a:xfrm>
+      </p:grpSpPr>
+      <p:sp>
+        <p:nvSpPr>
+          <p:cNvPr id="2" name="Slide Image Placeholder 1"/>
+          <p:cNvSpPr>
+            <a:spLocks noGrp="1" noRot="1" noChangeAspect="1"/>
+          </p:cNvSpPr>
+          <p:nvPr>
+            <p:ph type="sldImg"/>
+          </p:nvPr>
+        </p:nvSpPr>
+        <p:spPr>
+          <a:xfrm>
+            <a:off x="381000" y="685800"/>
+            <a:ext cx="6096000" cy="3429000"/>
+          </a:xfrm>
+        </p:spPr>
+      </p:sp>
+      <p:sp>
+        <p:nvSpPr>
+          <p:cNvPr id="3" name="Notes Placeholder 2"/>
+          <p:cNvSpPr>
+            <a:spLocks noGrp="1"/>
+          </p:cNvSpPr>
+          <p:nvPr>
+            <p:ph type="body" idx="1"/>
+          </p:nvPr>
+        </p:nvSpPr>
+        <p:spPr/>
+        <p:txBody>
+          <a:bodyPr/>
+          <a:lstStyle/>
+          <a:p>
+            <a:endParaRPr lang="en-US" dirty="0"/>
+          </a:p>
+        </p:txBody>
+      </p:sp>
+      <p:sp>
+        <p:nvSpPr>
+          <p:cNvPr id="4" name="Slide Number Placeholder 3"/>
+          <p:cNvSpPr>
+            <a:spLocks noGrp="1"/>
+          </p:cNvSpPr>
+          <p:nvPr>
+            <p:ph type="sldNum" sz="quarter" idx="5"/>
+          </p:nvPr>
+        </p:nvSpPr>
+        <p:spPr/>
+        <p:txBody>
+          <a:bodyPr/>
+          <a:lstStyle/>
+          <a:p>
+            <a:fld id="{84B7DBC5-2A13-CA47-B9EE-6017A92B6B18}" type="slidenum">
+              <a:rPr lang="en-US" smtClean="0"/>
+              <a:pPr/>
+              <a:t>10</a:t>
+            </a:fld>
+            <a:endParaRPr lang="en-US" dirty="0"/>
+          </a:p>
+        </p:txBody>
+      </p:sp>
+    </p:spTree>
+    <p:extLst>
+      <p:ext uri="{BB962C8B-B14F-4D97-AF65-F5344CB8AC3E}">
+        <p14:creationId xmlns:p14="http://schemas.microsoft.com/office/powerpoint/2010/main" val="2965649691"/>
+      </p:ext>
+    </p:extLst>
+  </p:cSld>
+  <p:clrMapOvr>
+    <a:masterClrMapping/>
+  </p:clrMapOvr>
+</p:notes>
+</file>
+
+<file path=ppt/notesSlides/notesSlide11.xml><?xml version="1.0" encoding="utf-8"?>
+<p:notes xmlns:a="http://schemas.openxmlformats.org/drawingml/2006/main" xmlns:r="http://schemas.openxmlformats.org/officeDocument/2006/relationships" xmlns:p="http://schemas.openxmlformats.org/presentationml/2006/main">
+  <p:cSld>
+    <p:spTree>
+      <p:nvGrpSpPr>
+        <p:cNvPr id="1" name=""/>
+        <p:cNvGrpSpPr/>
+        <p:nvPr/>
+      </p:nvGrpSpPr>
+      <p:grpSpPr>
+        <a:xfrm>
+          <a:off x="0" y="0"/>
+          <a:ext cx="0" cy="0"/>
+          <a:chOff x="0" y="0"/>
+          <a:chExt cx="0" cy="0"/>
+        </a:xfrm>
+      </p:grpSpPr>
+      <p:sp>
+        <p:nvSpPr>
+          <p:cNvPr id="2" name="Slide Image Placeholder 1"/>
+          <p:cNvSpPr>
+            <a:spLocks noGrp="1" noRot="1" noChangeAspect="1"/>
+          </p:cNvSpPr>
+          <p:nvPr>
+            <p:ph type="sldImg"/>
+          </p:nvPr>
+        </p:nvSpPr>
+        <p:spPr>
+          <a:xfrm>
+            <a:off x="381000" y="685800"/>
+            <a:ext cx="6096000" cy="3429000"/>
+          </a:xfrm>
+        </p:spPr>
+      </p:sp>
+      <p:sp>
+        <p:nvSpPr>
+          <p:cNvPr id="3" name="Notes Placeholder 2"/>
+          <p:cNvSpPr>
+            <a:spLocks noGrp="1"/>
+          </p:cNvSpPr>
+          <p:nvPr>
+            <p:ph type="body" idx="1"/>
+          </p:nvPr>
+        </p:nvSpPr>
+        <p:spPr/>
+        <p:txBody>
+          <a:bodyPr/>
+          <a:lstStyle/>
+          <a:p>
+            <a:endParaRPr lang="en-US" dirty="0"/>
+          </a:p>
+        </p:txBody>
+      </p:sp>
+      <p:sp>
+        <p:nvSpPr>
+          <p:cNvPr id="4" name="Slide Number Placeholder 3"/>
+          <p:cNvSpPr>
+            <a:spLocks noGrp="1"/>
+          </p:cNvSpPr>
+          <p:nvPr>
+            <p:ph type="sldNum" sz="quarter" idx="5"/>
+          </p:nvPr>
+        </p:nvSpPr>
+        <p:spPr/>
+        <p:txBody>
+          <a:bodyPr/>
+          <a:lstStyle/>
+          <a:p>
+            <a:fld id="{84B7DBC5-2A13-CA47-B9EE-6017A92B6B18}" type="slidenum">
+              <a:rPr lang="en-US" smtClean="0"/>
+              <a:pPr/>
+              <a:t>11</a:t>
+            </a:fld>
+            <a:endParaRPr lang="en-US" dirty="0"/>
+          </a:p>
+        </p:txBody>
+      </p:sp>
+    </p:spTree>
+    <p:extLst>
+      <p:ext uri="{BB962C8B-B14F-4D97-AF65-F5344CB8AC3E}">
+        <p14:creationId xmlns:p14="http://schemas.microsoft.com/office/powerpoint/2010/main" val="2491819466"/>
+      </p:ext>
+    </p:extLst>
+  </p:cSld>
+  <p:clrMapOvr>
+    <a:masterClrMapping/>
+  </p:clrMapOvr>
+</p:notes>
+</file>
+
+<file path=ppt/notesSlides/notesSlide12.xml><?xml version="1.0" encoding="utf-8"?>
+<p:notes xmlns:a="http://schemas.openxmlformats.org/drawingml/2006/main" xmlns:r="http://schemas.openxmlformats.org/officeDocument/2006/relationships" xmlns:p="http://schemas.openxmlformats.org/presentationml/2006/main">
+  <p:cSld>
+    <p:spTree>
+      <p:nvGrpSpPr>
+        <p:cNvPr id="1" name=""/>
+        <p:cNvGrpSpPr/>
+        <p:nvPr/>
+      </p:nvGrpSpPr>
+      <p:grpSpPr>
+        <a:xfrm>
+          <a:off x="0" y="0"/>
+          <a:ext cx="0" cy="0"/>
+          <a:chOff x="0" y="0"/>
+          <a:chExt cx="0" cy="0"/>
+        </a:xfrm>
+      </p:grpSpPr>
+      <p:sp>
+        <p:nvSpPr>
+          <p:cNvPr id="2" name="Slide Image Placeholder 1"/>
+          <p:cNvSpPr>
+            <a:spLocks noGrp="1" noRot="1" noChangeAspect="1"/>
+          </p:cNvSpPr>
+          <p:nvPr>
+            <p:ph type="sldImg"/>
+          </p:nvPr>
+        </p:nvSpPr>
+        <p:spPr>
+          <a:xfrm>
+            <a:off x="381000" y="685800"/>
+            <a:ext cx="6096000" cy="3429000"/>
+          </a:xfrm>
+        </p:spPr>
+      </p:sp>
+      <p:sp>
+        <p:nvSpPr>
+          <p:cNvPr id="3" name="Notes Placeholder 2"/>
+          <p:cNvSpPr>
+            <a:spLocks noGrp="1"/>
+          </p:cNvSpPr>
+          <p:nvPr>
+            <p:ph type="body" idx="1"/>
+          </p:nvPr>
+        </p:nvSpPr>
+        <p:spPr/>
+        <p:txBody>
+          <a:bodyPr/>
+          <a:lstStyle/>
+          <a:p>
+            <a:endParaRPr lang="en-US" dirty="0"/>
+          </a:p>
+        </p:txBody>
+      </p:sp>
+      <p:sp>
+        <p:nvSpPr>
+          <p:cNvPr id="4" name="Slide Number Placeholder 3"/>
+          <p:cNvSpPr>
+            <a:spLocks noGrp="1"/>
+          </p:cNvSpPr>
+          <p:nvPr>
+            <p:ph type="sldNum" sz="quarter" idx="5"/>
+          </p:nvPr>
+        </p:nvSpPr>
+        <p:spPr/>
+        <p:txBody>
+          <a:bodyPr/>
+          <a:lstStyle/>
+          <a:p>
+            <a:fld id="{84B7DBC5-2A13-CA47-B9EE-6017A92B6B18}" type="slidenum">
+              <a:rPr lang="en-US" smtClean="0"/>
+              <a:pPr/>
+              <a:t>12</a:t>
+            </a:fld>
+            <a:endParaRPr lang="en-US" dirty="0"/>
+          </a:p>
+        </p:txBody>
+      </p:sp>
+    </p:spTree>
+    <p:extLst>
+      <p:ext uri="{BB962C8B-B14F-4D97-AF65-F5344CB8AC3E}">
+        <p14:creationId xmlns:p14="http://schemas.microsoft.com/office/powerpoint/2010/main" val="1931935749"/>
+      </p:ext>
+    </p:extLst>
+  </p:cSld>
+  <p:clrMapOvr>
+    <a:masterClrMapping/>
+  </p:clrMapOvr>
+</p:notes>
+</file>
+
 <file path=ppt/notesSlides/notesSlide2.xml><?xml version="1.0" encoding="utf-8"?>
 <p:notes xmlns:a="http://schemas.openxmlformats.org/drawingml/2006/main" xmlns:r="http://schemas.openxmlformats.org/officeDocument/2006/relationships" xmlns:p="http://schemas.openxmlformats.org/presentationml/2006/main">
   <p:cSld>
@@ -1339,7 +1612,7 @@
     </p:spTree>
     <p:extLst>
       <p:ext uri="{BB962C8B-B14F-4D97-AF65-F5344CB8AC3E}">
-        <p14:creationId xmlns:p14="http://schemas.microsoft.com/office/powerpoint/2010/main" val="377088752"/>
+        <p14:creationId xmlns:p14="http://schemas.microsoft.com/office/powerpoint/2010/main" val="3415948890"/>
       </p:ext>
     </p:extLst>
   </p:cSld>
@@ -1429,7 +1702,7 @@
     </p:spTree>
     <p:extLst>
       <p:ext uri="{BB962C8B-B14F-4D97-AF65-F5344CB8AC3E}">
-        <p14:creationId xmlns:p14="http://schemas.microsoft.com/office/powerpoint/2010/main" val="2491819466"/>
+        <p14:creationId xmlns:p14="http://schemas.microsoft.com/office/powerpoint/2010/main" val="377088752"/>
       </p:ext>
     </p:extLst>
   </p:cSld>
@@ -1519,7 +1792,7 @@
     </p:spTree>
     <p:extLst>
       <p:ext uri="{BB962C8B-B14F-4D97-AF65-F5344CB8AC3E}">
-        <p14:creationId xmlns:p14="http://schemas.microsoft.com/office/powerpoint/2010/main" val="1931935749"/>
+        <p14:creationId xmlns:p14="http://schemas.microsoft.com/office/powerpoint/2010/main" val="1690563707"/>
       </p:ext>
     </p:extLst>
   </p:cSld>
@@ -5611,6 +5884,853 @@
 </p:sld>
 </file>
 
+<file path=ppt/slides/slide10.xml><?xml version="1.0" encoding="utf-8"?>
+<p:sld xmlns:a="http://schemas.openxmlformats.org/drawingml/2006/main" xmlns:r="http://schemas.openxmlformats.org/officeDocument/2006/relationships" xmlns:p="http://schemas.openxmlformats.org/presentationml/2006/main">
+  <p:cSld>
+    <p:spTree>
+      <p:nvGrpSpPr>
+        <p:cNvPr id="1" name=""/>
+        <p:cNvGrpSpPr/>
+        <p:nvPr/>
+      </p:nvGrpSpPr>
+      <p:grpSpPr>
+        <a:xfrm>
+          <a:off x="0" y="0"/>
+          <a:ext cx="0" cy="0"/>
+          <a:chOff x="0" y="0"/>
+          <a:chExt cx="0" cy="0"/>
+        </a:xfrm>
+      </p:grpSpPr>
+      <p:pic>
+        <p:nvPicPr>
+          <p:cNvPr id="10" name="Picture 9" descr="A close up of a logo&#10;&#10;Description automatically generated">
+            <a:extLst>
+              <a:ext uri="{FF2B5EF4-FFF2-40B4-BE49-F238E27FC236}">
+                <a16:creationId xmlns:a16="http://schemas.microsoft.com/office/drawing/2014/main" id="{EB0E368D-B9E5-F24D-A557-954B3EE5B1BB}"/>
+              </a:ext>
+            </a:extLst>
+          </p:cNvPr>
+          <p:cNvPicPr>
+            <a:picLocks noChangeAspect="1"/>
+          </p:cNvPicPr>
+          <p:nvPr/>
+        </p:nvPicPr>
+        <p:blipFill>
+          <a:blip r:embed="rId3"/>
+          <a:stretch>
+            <a:fillRect/>
+          </a:stretch>
+        </p:blipFill>
+        <p:spPr>
+          <a:xfrm>
+            <a:off x="9842023" y="5504940"/>
+            <a:ext cx="561913" cy="584135"/>
+          </a:xfrm>
+          <a:prstGeom prst="rect">
+            <a:avLst/>
+          </a:prstGeom>
+        </p:spPr>
+      </p:pic>
+      <p:sp>
+        <p:nvSpPr>
+          <p:cNvPr id="3" name="TextBox 2"/>
+          <p:cNvSpPr txBox="1"/>
+          <p:nvPr/>
+        </p:nvSpPr>
+        <p:spPr>
+          <a:xfrm>
+            <a:off x="4773865" y="3043300"/>
+            <a:ext cx="7151511" cy="369332"/>
+          </a:xfrm>
+          <a:prstGeom prst="rect">
+            <a:avLst/>
+          </a:prstGeom>
+          <a:noFill/>
+        </p:spPr>
+        <p:txBody>
+          <a:bodyPr wrap="square" rtlCol="0">
+            <a:spAutoFit/>
+          </a:bodyPr>
+          <a:lstStyle/>
+          <a:p>
+            <a:r>
+              <a:rPr lang="en-US" dirty="0">
+                <a:solidFill>
+                  <a:srgbClr val="2D637F"/>
+                </a:solidFill>
+              </a:rPr>
+              <a:t> </a:t>
+            </a:r>
+          </a:p>
+        </p:txBody>
+      </p:sp>
+      <p:sp>
+        <p:nvSpPr>
+          <p:cNvPr id="4" name="Title 3"/>
+          <p:cNvSpPr>
+            <a:spLocks noGrp="1"/>
+          </p:cNvSpPr>
+          <p:nvPr>
+            <p:ph type="title"/>
+          </p:nvPr>
+        </p:nvSpPr>
+        <p:spPr/>
+        <p:txBody>
+          <a:bodyPr>
+            <a:normAutofit/>
+          </a:bodyPr>
+          <a:lstStyle/>
+          <a:p>
+            <a:r>
+              <a:rPr lang="en-US" sz="5400" b="1" dirty="0">
+                <a:latin typeface="FreightSans Pro Book" panose="02000606030000020004" pitchFamily="2" charset="0"/>
+              </a:rPr>
+              <a:t>Course Communication</a:t>
+            </a:r>
+          </a:p>
+        </p:txBody>
+      </p:sp>
+      <p:sp>
+        <p:nvSpPr>
+          <p:cNvPr id="5" name="TextBox 4">
+            <a:extLst>
+              <a:ext uri="{FF2B5EF4-FFF2-40B4-BE49-F238E27FC236}">
+                <a16:creationId xmlns:a16="http://schemas.microsoft.com/office/drawing/2014/main" id="{AEB6CB19-00DE-B845-9A73-3780990C2596}"/>
+              </a:ext>
+            </a:extLst>
+          </p:cNvPr>
+          <p:cNvSpPr txBox="1"/>
+          <p:nvPr/>
+        </p:nvSpPr>
+        <p:spPr>
+          <a:xfrm>
+            <a:off x="609600" y="1796808"/>
+            <a:ext cx="9232423" cy="2862322"/>
+          </a:xfrm>
+          <a:prstGeom prst="rect">
+            <a:avLst/>
+          </a:prstGeom>
+          <a:noFill/>
+        </p:spPr>
+        <p:txBody>
+          <a:bodyPr wrap="square" rtlCol="0">
+            <a:spAutoFit/>
+          </a:bodyPr>
+          <a:lstStyle/>
+          <a:p>
+            <a:pPr algn="ctr"/>
+            <a:r>
+              <a:rPr lang="en-US" sz="3600" dirty="0">
+                <a:latin typeface="FreightSans Pro Book" panose="02000606030000020004" pitchFamily="2" charset="0"/>
+              </a:rPr>
+              <a:t>This class involves a team project. Please keep in mind that we want to work together and mentor one another. When you come to this class, please have a </a:t>
+            </a:r>
+            <a:r>
+              <a:rPr lang="en-US" sz="3600" b="1" dirty="0">
+                <a:solidFill>
+                  <a:srgbClr val="C28220"/>
+                </a:solidFill>
+                <a:latin typeface="FreightSans Pro Book" panose="02000606030000020004" pitchFamily="2" charset="0"/>
+              </a:rPr>
+              <a:t>collaborative mindset </a:t>
+            </a:r>
+            <a:r>
+              <a:rPr lang="en-US" sz="3600" dirty="0">
+                <a:latin typeface="FreightSans Pro Book" panose="02000606030000020004" pitchFamily="2" charset="0"/>
+              </a:rPr>
+              <a:t>(unless it’s an individual assignment </a:t>
+            </a:r>
+            <a:r>
+              <a:rPr lang="en-US" sz="3600" dirty="0">
+                <a:latin typeface="FreightSans Pro Book" panose="02000606030000020004" pitchFamily="2" charset="0"/>
+                <a:sym typeface="Wingdings" panose="05000000000000000000" pitchFamily="2" charset="2"/>
+              </a:rPr>
+              <a:t> )</a:t>
+            </a:r>
+            <a:r>
+              <a:rPr lang="en-US" sz="3600" dirty="0">
+                <a:latin typeface="FreightSans Pro Book" panose="02000606030000020004" pitchFamily="2" charset="0"/>
+              </a:rPr>
+              <a:t>.</a:t>
+            </a:r>
+          </a:p>
+        </p:txBody>
+      </p:sp>
+    </p:spTree>
+    <p:extLst>
+      <p:ext uri="{BB962C8B-B14F-4D97-AF65-F5344CB8AC3E}">
+        <p14:creationId xmlns:p14="http://schemas.microsoft.com/office/powerpoint/2010/main" val="2724341440"/>
+      </p:ext>
+    </p:extLst>
+  </p:cSld>
+  <p:clrMapOvr>
+    <a:masterClrMapping/>
+  </p:clrMapOvr>
+</p:sld>
+</file>
+
+<file path=ppt/slides/slide11.xml><?xml version="1.0" encoding="utf-8"?>
+<p:sld xmlns:a="http://schemas.openxmlformats.org/drawingml/2006/main" xmlns:r="http://schemas.openxmlformats.org/officeDocument/2006/relationships" xmlns:p="http://schemas.openxmlformats.org/presentationml/2006/main">
+  <p:cSld>
+    <p:spTree>
+      <p:nvGrpSpPr>
+        <p:cNvPr id="1" name=""/>
+        <p:cNvGrpSpPr/>
+        <p:nvPr/>
+      </p:nvGrpSpPr>
+      <p:grpSpPr>
+        <a:xfrm>
+          <a:off x="0" y="0"/>
+          <a:ext cx="0" cy="0"/>
+          <a:chOff x="0" y="0"/>
+          <a:chExt cx="0" cy="0"/>
+        </a:xfrm>
+      </p:grpSpPr>
+      <p:pic>
+        <p:nvPicPr>
+          <p:cNvPr id="10" name="Picture 9" descr="A close up of a logo&#10;&#10;Description automatically generated">
+            <a:extLst>
+              <a:ext uri="{FF2B5EF4-FFF2-40B4-BE49-F238E27FC236}">
+                <a16:creationId xmlns:a16="http://schemas.microsoft.com/office/drawing/2014/main" id="{EB0E368D-B9E5-F24D-A557-954B3EE5B1BB}"/>
+              </a:ext>
+            </a:extLst>
+          </p:cNvPr>
+          <p:cNvPicPr>
+            <a:picLocks noChangeAspect="1"/>
+          </p:cNvPicPr>
+          <p:nvPr/>
+        </p:nvPicPr>
+        <p:blipFill>
+          <a:blip r:embed="rId3"/>
+          <a:stretch>
+            <a:fillRect/>
+          </a:stretch>
+        </p:blipFill>
+        <p:spPr>
+          <a:xfrm>
+            <a:off x="9842023" y="5504940"/>
+            <a:ext cx="561913" cy="584135"/>
+          </a:xfrm>
+          <a:prstGeom prst="rect">
+            <a:avLst/>
+          </a:prstGeom>
+        </p:spPr>
+      </p:pic>
+      <p:sp>
+        <p:nvSpPr>
+          <p:cNvPr id="3" name="TextBox 2"/>
+          <p:cNvSpPr txBox="1"/>
+          <p:nvPr/>
+        </p:nvSpPr>
+        <p:spPr>
+          <a:xfrm>
+            <a:off x="4773865" y="3043300"/>
+            <a:ext cx="7151511" cy="369332"/>
+          </a:xfrm>
+          <a:prstGeom prst="rect">
+            <a:avLst/>
+          </a:prstGeom>
+          <a:noFill/>
+        </p:spPr>
+        <p:txBody>
+          <a:bodyPr wrap="square" rtlCol="0">
+            <a:spAutoFit/>
+          </a:bodyPr>
+          <a:lstStyle/>
+          <a:p>
+            <a:r>
+              <a:rPr lang="en-US" dirty="0">
+                <a:solidFill>
+                  <a:srgbClr val="2D637F"/>
+                </a:solidFill>
+              </a:rPr>
+              <a:t> </a:t>
+            </a:r>
+          </a:p>
+        </p:txBody>
+      </p:sp>
+      <p:sp>
+        <p:nvSpPr>
+          <p:cNvPr id="4" name="Title 3"/>
+          <p:cNvSpPr>
+            <a:spLocks noGrp="1"/>
+          </p:cNvSpPr>
+          <p:nvPr>
+            <p:ph type="title"/>
+          </p:nvPr>
+        </p:nvSpPr>
+        <p:spPr/>
+        <p:txBody>
+          <a:bodyPr>
+            <a:normAutofit/>
+          </a:bodyPr>
+          <a:lstStyle/>
+          <a:p>
+            <a:r>
+              <a:rPr lang="en-US" sz="5400" b="1" dirty="0">
+                <a:latin typeface="FreightSans Pro Book" panose="02000606030000020004" pitchFamily="2" charset="0"/>
+              </a:rPr>
+              <a:t>Class Code of Conduct</a:t>
+            </a:r>
+          </a:p>
+        </p:txBody>
+      </p:sp>
+      <p:sp>
+        <p:nvSpPr>
+          <p:cNvPr id="5" name="TextBox 4">
+            <a:extLst>
+              <a:ext uri="{FF2B5EF4-FFF2-40B4-BE49-F238E27FC236}">
+                <a16:creationId xmlns:a16="http://schemas.microsoft.com/office/drawing/2014/main" id="{AEB6CB19-00DE-B845-9A73-3780990C2596}"/>
+              </a:ext>
+            </a:extLst>
+          </p:cNvPr>
+          <p:cNvSpPr txBox="1"/>
+          <p:nvPr/>
+        </p:nvSpPr>
+        <p:spPr>
+          <a:xfrm>
+            <a:off x="2259110" y="1954879"/>
+            <a:ext cx="7582913" cy="3416320"/>
+          </a:xfrm>
+          <a:prstGeom prst="rect">
+            <a:avLst/>
+          </a:prstGeom>
+          <a:noFill/>
+        </p:spPr>
+        <p:txBody>
+          <a:bodyPr wrap="square" rtlCol="0">
+            <a:spAutoFit/>
+          </a:bodyPr>
+          <a:lstStyle/>
+          <a:p>
+            <a:r>
+              <a:rPr lang="en-US" sz="2400" b="1" dirty="0">
+                <a:solidFill>
+                  <a:srgbClr val="003262"/>
+                </a:solidFill>
+                <a:latin typeface="FreightMicro Pro Book" panose="02000603020000020004" pitchFamily="2" charset="0"/>
+              </a:rPr>
+              <a:t>Our Pledge </a:t>
+            </a:r>
+          </a:p>
+          <a:p>
+            <a:r>
+              <a:rPr lang="en-US" sz="2400" dirty="0">
+                <a:latin typeface="FreightSans Pro Book" panose="02000606030000020004" pitchFamily="2" charset="0"/>
+              </a:rPr>
+              <a:t>In the interest of fostering an open and welcoming environment, we as students and instructors pledge to making participation in this course and our community a harassment-free experience for everyone, regardless of age, body size, disability, ethnicity, gender identity and expression, level of experience, nationality, personal appearance, race, religion, or sexual identity and orientation. </a:t>
+            </a:r>
+          </a:p>
+        </p:txBody>
+      </p:sp>
+      <p:sp>
+        <p:nvSpPr>
+          <p:cNvPr id="7" name="TextBox 6">
+            <a:extLst>
+              <a:ext uri="{FF2B5EF4-FFF2-40B4-BE49-F238E27FC236}">
+                <a16:creationId xmlns:a16="http://schemas.microsoft.com/office/drawing/2014/main" id="{D999A612-77AA-4845-BFBC-D71AF39558BB}"/>
+              </a:ext>
+            </a:extLst>
+          </p:cNvPr>
+          <p:cNvSpPr txBox="1"/>
+          <p:nvPr/>
+        </p:nvSpPr>
+        <p:spPr>
+          <a:xfrm>
+            <a:off x="2378948" y="6625898"/>
+            <a:ext cx="7499169" cy="253916"/>
+          </a:xfrm>
+          <a:prstGeom prst="rect">
+            <a:avLst/>
+          </a:prstGeom>
+          <a:noFill/>
+        </p:spPr>
+        <p:txBody>
+          <a:bodyPr wrap="none" rtlCol="0">
+            <a:spAutoFit/>
+          </a:bodyPr>
+          <a:lstStyle/>
+          <a:p>
+            <a:r>
+              <a:rPr lang="en-US" sz="1050" dirty="0">
+                <a:solidFill>
+                  <a:schemeClr val="bg1"/>
+                </a:solidFill>
+                <a:latin typeface="FreightMicro Pro Book" panose="02000603020000020004" pitchFamily="2" charset="0"/>
+              </a:rPr>
+              <a:t>This Code of Conduct is adapted from the </a:t>
+            </a:r>
+            <a:r>
+              <a:rPr lang="en-US" sz="1050" dirty="0">
+                <a:solidFill>
+                  <a:schemeClr val="bg1"/>
+                </a:solidFill>
+                <a:latin typeface="FreightMicro Pro Book" panose="02000603020000020004" pitchFamily="2" charset="0"/>
+                <a:hlinkClick r:id="rId4">
+                  <a:extLst>
+                    <a:ext uri="{A12FA001-AC4F-418D-AE19-62706E023703}">
+                      <ahyp:hlinkClr xmlns:ahyp="http://schemas.microsoft.com/office/drawing/2018/hyperlinkcolor" val="tx"/>
+                    </a:ext>
+                  </a:extLst>
+                </a:hlinkClick>
+              </a:rPr>
+              <a:t>Contributor Covenant</a:t>
+            </a:r>
+            <a:r>
+              <a:rPr lang="en-US" sz="1050" dirty="0">
+                <a:solidFill>
+                  <a:schemeClr val="bg1"/>
+                </a:solidFill>
+                <a:latin typeface="FreightMicro Pro Book" panose="02000603020000020004" pitchFamily="2" charset="0"/>
+              </a:rPr>
+              <a:t>, version 1.4, available at </a:t>
+            </a:r>
+            <a:r>
+              <a:rPr lang="en-US" sz="1050" dirty="0">
+                <a:solidFill>
+                  <a:schemeClr val="bg1"/>
+                </a:solidFill>
+                <a:latin typeface="FreightMicro Pro Book" panose="02000603020000020004" pitchFamily="2" charset="0"/>
+                <a:hlinkClick r:id="rId5">
+                  <a:extLst>
+                    <a:ext uri="{A12FA001-AC4F-418D-AE19-62706E023703}">
+                      <ahyp:hlinkClr xmlns:ahyp="http://schemas.microsoft.com/office/drawing/2018/hyperlinkcolor" val="tx"/>
+                    </a:ext>
+                  </a:extLst>
+                </a:hlinkClick>
+              </a:rPr>
+              <a:t>http://contributor-covenant.org/version/1/4</a:t>
+            </a:r>
+            <a:endParaRPr lang="en-US" sz="1050" dirty="0">
+              <a:solidFill>
+                <a:schemeClr val="bg1"/>
+              </a:solidFill>
+              <a:latin typeface="FreightMicro Pro Book" panose="02000603020000020004" pitchFamily="2" charset="0"/>
+            </a:endParaRPr>
+          </a:p>
+        </p:txBody>
+      </p:sp>
+    </p:spTree>
+    <p:extLst>
+      <p:ext uri="{BB962C8B-B14F-4D97-AF65-F5344CB8AC3E}">
+        <p14:creationId xmlns:p14="http://schemas.microsoft.com/office/powerpoint/2010/main" val="270888353"/>
+      </p:ext>
+    </p:extLst>
+  </p:cSld>
+  <p:clrMapOvr>
+    <a:masterClrMapping/>
+  </p:clrMapOvr>
+</p:sld>
+</file>
+
+<file path=ppt/slides/slide12.xml><?xml version="1.0" encoding="utf-8"?>
+<p:sld xmlns:a="http://schemas.openxmlformats.org/drawingml/2006/main" xmlns:r="http://schemas.openxmlformats.org/officeDocument/2006/relationships" xmlns:p="http://schemas.openxmlformats.org/presentationml/2006/main">
+  <p:cSld>
+    <p:spTree>
+      <p:nvGrpSpPr>
+        <p:cNvPr id="1" name=""/>
+        <p:cNvGrpSpPr/>
+        <p:nvPr/>
+      </p:nvGrpSpPr>
+      <p:grpSpPr>
+        <a:xfrm>
+          <a:off x="0" y="0"/>
+          <a:ext cx="0" cy="0"/>
+          <a:chOff x="0" y="0"/>
+          <a:chExt cx="0" cy="0"/>
+        </a:xfrm>
+      </p:grpSpPr>
+      <p:pic>
+        <p:nvPicPr>
+          <p:cNvPr id="10" name="Picture 9" descr="A close up of a logo&#10;&#10;Description automatically generated">
+            <a:extLst>
+              <a:ext uri="{FF2B5EF4-FFF2-40B4-BE49-F238E27FC236}">
+                <a16:creationId xmlns:a16="http://schemas.microsoft.com/office/drawing/2014/main" id="{EB0E368D-B9E5-F24D-A557-954B3EE5B1BB}"/>
+              </a:ext>
+            </a:extLst>
+          </p:cNvPr>
+          <p:cNvPicPr>
+            <a:picLocks noChangeAspect="1"/>
+          </p:cNvPicPr>
+          <p:nvPr/>
+        </p:nvPicPr>
+        <p:blipFill>
+          <a:blip r:embed="rId3"/>
+          <a:stretch>
+            <a:fillRect/>
+          </a:stretch>
+        </p:blipFill>
+        <p:spPr>
+          <a:xfrm>
+            <a:off x="9842023" y="5504940"/>
+            <a:ext cx="561913" cy="584135"/>
+          </a:xfrm>
+          <a:prstGeom prst="rect">
+            <a:avLst/>
+          </a:prstGeom>
+        </p:spPr>
+      </p:pic>
+      <p:sp>
+        <p:nvSpPr>
+          <p:cNvPr id="3" name="TextBox 2"/>
+          <p:cNvSpPr txBox="1"/>
+          <p:nvPr/>
+        </p:nvSpPr>
+        <p:spPr>
+          <a:xfrm>
+            <a:off x="4773865" y="3043300"/>
+            <a:ext cx="7151511" cy="369332"/>
+          </a:xfrm>
+          <a:prstGeom prst="rect">
+            <a:avLst/>
+          </a:prstGeom>
+          <a:noFill/>
+        </p:spPr>
+        <p:txBody>
+          <a:bodyPr wrap="square" rtlCol="0">
+            <a:spAutoFit/>
+          </a:bodyPr>
+          <a:lstStyle/>
+          <a:p>
+            <a:r>
+              <a:rPr lang="en-US" dirty="0">
+                <a:solidFill>
+                  <a:srgbClr val="2D637F"/>
+                </a:solidFill>
+              </a:rPr>
+              <a:t> </a:t>
+            </a:r>
+          </a:p>
+        </p:txBody>
+      </p:sp>
+      <p:sp>
+        <p:nvSpPr>
+          <p:cNvPr id="4" name="Title 3"/>
+          <p:cNvSpPr>
+            <a:spLocks noGrp="1"/>
+          </p:cNvSpPr>
+          <p:nvPr>
+            <p:ph type="title"/>
+          </p:nvPr>
+        </p:nvSpPr>
+        <p:spPr/>
+        <p:txBody>
+          <a:bodyPr>
+            <a:normAutofit/>
+          </a:bodyPr>
+          <a:lstStyle/>
+          <a:p>
+            <a:r>
+              <a:rPr lang="en-US" sz="5400" b="1" dirty="0">
+                <a:latin typeface="FreightSans Pro Book" panose="02000606030000020004" pitchFamily="2" charset="0"/>
+              </a:rPr>
+              <a:t>Class Code of Conduct</a:t>
+            </a:r>
+          </a:p>
+        </p:txBody>
+      </p:sp>
+      <p:sp>
+        <p:nvSpPr>
+          <p:cNvPr id="5" name="TextBox 4">
+            <a:extLst>
+              <a:ext uri="{FF2B5EF4-FFF2-40B4-BE49-F238E27FC236}">
+                <a16:creationId xmlns:a16="http://schemas.microsoft.com/office/drawing/2014/main" id="{AEB6CB19-00DE-B845-9A73-3780990C2596}"/>
+              </a:ext>
+            </a:extLst>
+          </p:cNvPr>
+          <p:cNvSpPr txBox="1"/>
+          <p:nvPr/>
+        </p:nvSpPr>
+        <p:spPr>
+          <a:xfrm>
+            <a:off x="609563" y="1213989"/>
+            <a:ext cx="9232460" cy="4462760"/>
+          </a:xfrm>
+          <a:prstGeom prst="rect">
+            <a:avLst/>
+          </a:prstGeom>
+          <a:noFill/>
+        </p:spPr>
+        <p:txBody>
+          <a:bodyPr wrap="square" rtlCol="0">
+            <a:spAutoFit/>
+          </a:bodyPr>
+          <a:lstStyle/>
+          <a:p>
+            <a:r>
+              <a:rPr lang="en-US" b="1" dirty="0">
+                <a:solidFill>
+                  <a:srgbClr val="003262"/>
+                </a:solidFill>
+                <a:latin typeface="FreightMicro Pro Book" panose="02000603020000020004" pitchFamily="2" charset="0"/>
+              </a:rPr>
+              <a:t>Our Standards</a:t>
+            </a:r>
+          </a:p>
+          <a:p>
+            <a:endParaRPr lang="en-US" b="1" dirty="0">
+              <a:solidFill>
+                <a:srgbClr val="003262"/>
+              </a:solidFill>
+              <a:latin typeface="FreightMicro Pro Book" panose="02000603020000020004" pitchFamily="2" charset="0"/>
+            </a:endParaRPr>
+          </a:p>
+          <a:p>
+            <a:r>
+              <a:rPr lang="en-US" sz="1600" b="1" dirty="0">
+                <a:solidFill>
+                  <a:srgbClr val="C28220"/>
+                </a:solidFill>
+                <a:latin typeface="FreightMicro Pro Book" panose="02000603020000020004" pitchFamily="2" charset="0"/>
+              </a:rPr>
+              <a:t>Examples of behavior that contributes to creating a positive environment include: </a:t>
+            </a:r>
+          </a:p>
+          <a:p>
+            <a:pPr marL="285750" indent="-285750">
+              <a:buFont typeface="Arial" panose="020B0604020202020204" pitchFamily="34" charset="0"/>
+              <a:buChar char="•"/>
+            </a:pPr>
+            <a:r>
+              <a:rPr lang="en-US" dirty="0">
+                <a:latin typeface="FreightSans Pro Book" panose="02000606030000020004" pitchFamily="2" charset="0"/>
+              </a:rPr>
+              <a:t>Using welcoming and inclusive language </a:t>
+            </a:r>
+          </a:p>
+          <a:p>
+            <a:pPr marL="285750" indent="-285750">
+              <a:buFont typeface="Arial" panose="020B0604020202020204" pitchFamily="34" charset="0"/>
+              <a:buChar char="•"/>
+            </a:pPr>
+            <a:r>
+              <a:rPr lang="en-US" dirty="0">
+                <a:latin typeface="FreightSans Pro Book" panose="02000606030000020004" pitchFamily="2" charset="0"/>
+              </a:rPr>
+              <a:t>Being respectful of differing viewpoints and experiences </a:t>
+            </a:r>
+          </a:p>
+          <a:p>
+            <a:pPr marL="285750" indent="-285750">
+              <a:buFont typeface="Arial" panose="020B0604020202020204" pitchFamily="34" charset="0"/>
+              <a:buChar char="•"/>
+            </a:pPr>
+            <a:r>
+              <a:rPr lang="en-US" dirty="0">
+                <a:latin typeface="FreightSans Pro Book" panose="02000606030000020004" pitchFamily="2" charset="0"/>
+              </a:rPr>
+              <a:t>Gracefully accepting constructive criticism </a:t>
+            </a:r>
+          </a:p>
+          <a:p>
+            <a:pPr marL="285750" indent="-285750">
+              <a:buFont typeface="Arial" panose="020B0604020202020204" pitchFamily="34" charset="0"/>
+              <a:buChar char="•"/>
+            </a:pPr>
+            <a:r>
+              <a:rPr lang="en-US" dirty="0">
+                <a:latin typeface="FreightSans Pro Book" panose="02000606030000020004" pitchFamily="2" charset="0"/>
+              </a:rPr>
+              <a:t>Focusing on what is best for the community </a:t>
+            </a:r>
+          </a:p>
+          <a:p>
+            <a:pPr marL="285750" indent="-285750">
+              <a:buFont typeface="Arial" panose="020B0604020202020204" pitchFamily="34" charset="0"/>
+              <a:buChar char="•"/>
+            </a:pPr>
+            <a:r>
+              <a:rPr lang="en-US" dirty="0">
+                <a:latin typeface="FreightSans Pro Book" panose="02000606030000020004" pitchFamily="2" charset="0"/>
+              </a:rPr>
+              <a:t>Showing empathy towards other community members</a:t>
+            </a:r>
+          </a:p>
+          <a:p>
+            <a:pPr marL="285750" indent="-285750">
+              <a:buFont typeface="Arial" panose="020B0604020202020204" pitchFamily="34" charset="0"/>
+              <a:buChar char="•"/>
+            </a:pPr>
+            <a:endParaRPr lang="en-US" dirty="0">
+              <a:solidFill>
+                <a:srgbClr val="003262"/>
+              </a:solidFill>
+              <a:latin typeface="FreightSans Pro Book" panose="02000606030000020004" pitchFamily="2" charset="0"/>
+            </a:endParaRPr>
+          </a:p>
+          <a:p>
+            <a:r>
+              <a:rPr lang="en-US" sz="1600" b="1" dirty="0">
+                <a:solidFill>
+                  <a:srgbClr val="C28220"/>
+                </a:solidFill>
+                <a:latin typeface="FreightMicro Pro Book" panose="02000603020000020004" pitchFamily="2" charset="0"/>
+              </a:rPr>
+              <a:t>Examples of unacceptable behavior by participants include: </a:t>
+            </a:r>
+          </a:p>
+          <a:p>
+            <a:pPr marL="285750" indent="-285750">
+              <a:buFont typeface="Arial" panose="020B0604020202020204" pitchFamily="34" charset="0"/>
+              <a:buChar char="•"/>
+            </a:pPr>
+            <a:r>
+              <a:rPr lang="en-US" dirty="0">
+                <a:latin typeface="FreightSans Pro Book" panose="02000606030000020004" pitchFamily="2" charset="0"/>
+              </a:rPr>
+              <a:t>The use of sexualized language or imagery and unwelcome sexual attention or advances </a:t>
+            </a:r>
+          </a:p>
+          <a:p>
+            <a:pPr marL="285750" indent="-285750">
+              <a:buFont typeface="Arial" panose="020B0604020202020204" pitchFamily="34" charset="0"/>
+              <a:buChar char="•"/>
+            </a:pPr>
+            <a:r>
+              <a:rPr lang="en-US" dirty="0">
+                <a:latin typeface="FreightSans Pro Book" panose="02000606030000020004" pitchFamily="2" charset="0"/>
+              </a:rPr>
+              <a:t>Trolling, insulting/derogatory comments, and personal or political attacks</a:t>
+            </a:r>
+          </a:p>
+          <a:p>
+            <a:pPr marL="285750" indent="-285750">
+              <a:buFont typeface="Arial" panose="020B0604020202020204" pitchFamily="34" charset="0"/>
+              <a:buChar char="•"/>
+            </a:pPr>
+            <a:r>
+              <a:rPr lang="en-US" dirty="0">
+                <a:latin typeface="FreightSans Pro Book" panose="02000606030000020004" pitchFamily="2" charset="0"/>
+              </a:rPr>
+              <a:t>Public or private harassment </a:t>
+            </a:r>
+          </a:p>
+          <a:p>
+            <a:pPr marL="285750" indent="-285750">
+              <a:buFont typeface="Arial" panose="020B0604020202020204" pitchFamily="34" charset="0"/>
+              <a:buChar char="•"/>
+            </a:pPr>
+            <a:r>
+              <a:rPr lang="en-US" dirty="0">
+                <a:latin typeface="FreightSans Pro Book" panose="02000606030000020004" pitchFamily="2" charset="0"/>
+              </a:rPr>
+              <a:t>Publishing others' private information, such as a physical or electronic address, without explicit permission </a:t>
+            </a:r>
+          </a:p>
+          <a:p>
+            <a:pPr marL="285750" indent="-285750">
+              <a:buFont typeface="Arial" panose="020B0604020202020204" pitchFamily="34" charset="0"/>
+              <a:buChar char="•"/>
+            </a:pPr>
+            <a:r>
+              <a:rPr lang="en-US" dirty="0">
+                <a:latin typeface="FreightSans Pro Book" panose="02000606030000020004" pitchFamily="2" charset="0"/>
+              </a:rPr>
+              <a:t>Other conduct which could reasonably be considered inappropriate in a professional setting</a:t>
+            </a:r>
+          </a:p>
+        </p:txBody>
+      </p:sp>
+      <p:sp>
+        <p:nvSpPr>
+          <p:cNvPr id="6" name="TextBox 5">
+            <a:extLst>
+              <a:ext uri="{FF2B5EF4-FFF2-40B4-BE49-F238E27FC236}">
+                <a16:creationId xmlns:a16="http://schemas.microsoft.com/office/drawing/2014/main" id="{CB17A27A-E613-CA42-9769-DDEDADD77256}"/>
+              </a:ext>
+            </a:extLst>
+          </p:cNvPr>
+          <p:cNvSpPr txBox="1"/>
+          <p:nvPr/>
+        </p:nvSpPr>
+        <p:spPr>
+          <a:xfrm>
+            <a:off x="2378948" y="6625898"/>
+            <a:ext cx="7499169" cy="253916"/>
+          </a:xfrm>
+          <a:prstGeom prst="rect">
+            <a:avLst/>
+          </a:prstGeom>
+          <a:noFill/>
+        </p:spPr>
+        <p:txBody>
+          <a:bodyPr wrap="none" rtlCol="0">
+            <a:spAutoFit/>
+          </a:bodyPr>
+          <a:lstStyle/>
+          <a:p>
+            <a:r>
+              <a:rPr lang="en-US" sz="1050" dirty="0">
+                <a:solidFill>
+                  <a:schemeClr val="bg1"/>
+                </a:solidFill>
+                <a:latin typeface="FreightMicro Pro Book" panose="02000603020000020004" pitchFamily="2" charset="0"/>
+              </a:rPr>
+              <a:t>This Code of Conduct is adapted from the </a:t>
+            </a:r>
+            <a:r>
+              <a:rPr lang="en-US" sz="1050" dirty="0">
+                <a:solidFill>
+                  <a:schemeClr val="bg1"/>
+                </a:solidFill>
+                <a:latin typeface="FreightMicro Pro Book" panose="02000603020000020004" pitchFamily="2" charset="0"/>
+                <a:hlinkClick r:id="rId4">
+                  <a:extLst>
+                    <a:ext uri="{A12FA001-AC4F-418D-AE19-62706E023703}">
+                      <ahyp:hlinkClr xmlns:ahyp="http://schemas.microsoft.com/office/drawing/2018/hyperlinkcolor" val="tx"/>
+                    </a:ext>
+                  </a:extLst>
+                </a:hlinkClick>
+              </a:rPr>
+              <a:t>Contributor Covenant</a:t>
+            </a:r>
+            <a:r>
+              <a:rPr lang="en-US" sz="1050" dirty="0">
+                <a:solidFill>
+                  <a:schemeClr val="bg1"/>
+                </a:solidFill>
+                <a:latin typeface="FreightMicro Pro Book" panose="02000603020000020004" pitchFamily="2" charset="0"/>
+              </a:rPr>
+              <a:t>, version 1.4, available at </a:t>
+            </a:r>
+            <a:r>
+              <a:rPr lang="en-US" sz="1050" dirty="0">
+                <a:solidFill>
+                  <a:schemeClr val="bg1"/>
+                </a:solidFill>
+                <a:latin typeface="FreightMicro Pro Book" panose="02000603020000020004" pitchFamily="2" charset="0"/>
+                <a:hlinkClick r:id="rId5">
+                  <a:extLst>
+                    <a:ext uri="{A12FA001-AC4F-418D-AE19-62706E023703}">
+                      <ahyp:hlinkClr xmlns:ahyp="http://schemas.microsoft.com/office/drawing/2018/hyperlinkcolor" val="tx"/>
+                    </a:ext>
+                  </a:extLst>
+                </a:hlinkClick>
+              </a:rPr>
+              <a:t>http://contributor-covenant.org/version/1/4</a:t>
+            </a:r>
+            <a:endParaRPr lang="en-US" sz="1050" dirty="0">
+              <a:solidFill>
+                <a:schemeClr val="bg1"/>
+              </a:solidFill>
+              <a:latin typeface="FreightMicro Pro Book" panose="02000603020000020004" pitchFamily="2" charset="0"/>
+            </a:endParaRPr>
+          </a:p>
+        </p:txBody>
+      </p:sp>
+    </p:spTree>
+    <p:extLst>
+      <p:ext uri="{BB962C8B-B14F-4D97-AF65-F5344CB8AC3E}">
+        <p14:creationId xmlns:p14="http://schemas.microsoft.com/office/powerpoint/2010/main" val="2367710415"/>
+      </p:ext>
+    </p:extLst>
+  </p:cSld>
+  <p:clrMapOvr>
+    <a:masterClrMapping/>
+  </p:clrMapOvr>
+</p:sld>
+</file>
+
 <file path=ppt/slides/slide2.xml><?xml version="1.0" encoding="utf-8"?>
 <p:sld xmlns:a="http://schemas.openxmlformats.org/drawingml/2006/main" xmlns:r="http://schemas.openxmlformats.org/officeDocument/2006/relationships" xmlns:p="http://schemas.openxmlformats.org/presentationml/2006/main">
   <p:cSld>
@@ -6552,7 +7672,7 @@
                 </a:solidFill>
                 <a:latin typeface="FreightMicro Pro Book" panose="02000603020000020004" pitchFamily="2" charset="0"/>
               </a:rPr>
-              <a:t> – our goal is to learn! </a:t>
+              <a:t> – our goal is to learn and work together! </a:t>
             </a:r>
             <a:r>
               <a:rPr lang="en-US" dirty="0">
@@ -7074,7 +8194,7 @@
               <a:rPr lang="en-US" sz="5400" b="1" dirty="0">
                 <a:latin typeface="FreightSans Pro Book" panose="02000606030000020004" pitchFamily="2" charset="0"/>
               </a:rPr>
-              <a:t>Course Communication</a:t>
+              <a:t>Grade Breakdown</a:t>
             </a:r>
           </a:p>
         </p:txBody>
@@ -7093,8 +8213,8 @@
         </p:nvSpPr>
         <p:spPr>
           <a:xfrm>
-            <a:off x="609600" y="1796808"/>
-            <a:ext cx="9232423" cy="3046988"/>
+            <a:off x="609600" y="1663701"/>
+            <a:ext cx="9232423" cy="3724096"/>
           </a:xfrm>
           <a:prstGeom prst="rect">
             <a:avLst/>
@@ -7107,99 +8227,165 @@
           </a:bodyPr>
           <a:lstStyle/>
           <a:p>
-            <a:r>
-              <a:rPr lang="en-US" sz="2400" b="1" dirty="0" err="1">
+            <a:pPr algn="l"/>
+            <a:r>
+              <a:rPr lang="en-US" sz="2000" b="1" i="0" dirty="0">
                 <a:solidFill>
                   <a:srgbClr val="003262"/>
                 </a:solidFill>
-                <a:latin typeface="FreightMicro Pro Book" panose="02000603020000020004" pitchFamily="2" charset="0"/>
-              </a:rPr>
-              <a:t>bCourses</a:t>
-            </a:r>
-            <a:r>
-              <a:rPr lang="en-US" sz="2400" b="1" dirty="0">
+                <a:effectLst/>
+                <a:latin typeface="FreightMicro Pro Book" panose="02000603020000020004" pitchFamily="50" charset="0"/>
+              </a:rPr>
+              <a:t>Individual Homework: 40%</a:t>
+            </a:r>
+          </a:p>
+          <a:p>
+            <a:pPr marL="742950" lvl="1" indent="-285750" algn="l">
+              <a:buFont typeface="Arial" panose="020B0604020202020204" pitchFamily="34" charset="0"/>
+              <a:buChar char="•"/>
+            </a:pPr>
+            <a:r>
+              <a:rPr lang="en-US" sz="2000" b="0" i="0" dirty="0">
+                <a:solidFill>
+                  <a:srgbClr val="333333"/>
+                </a:solidFill>
+                <a:effectLst/>
+                <a:latin typeface="FreightSans Pro Book" panose="02000606030000020004" pitchFamily="50" charset="0"/>
+              </a:rPr>
+              <a:t>4 individual coding challenges (8 points each)</a:t>
+            </a:r>
+          </a:p>
+          <a:p>
+            <a:pPr marL="742950" lvl="1" indent="-285750" algn="l">
+              <a:buFont typeface="Arial" panose="020B0604020202020204" pitchFamily="34" charset="0"/>
+              <a:buChar char="•"/>
+            </a:pPr>
+            <a:r>
+              <a:rPr lang="en-US" sz="2000" b="0" i="0" dirty="0">
+                <a:solidFill>
+                  <a:srgbClr val="333333"/>
+                </a:solidFill>
+                <a:effectLst/>
+                <a:latin typeface="FreightSans Pro Book" panose="02000606030000020004" pitchFamily="50" charset="0"/>
+              </a:rPr>
+              <a:t>4 blog posts (2 points each)</a:t>
+            </a:r>
+          </a:p>
+          <a:p>
+            <a:pPr lvl="1" algn="l"/>
+            <a:endParaRPr lang="en-US" sz="2000" b="0" i="0" dirty="0">
+              <a:solidFill>
+                <a:srgbClr val="333333"/>
+              </a:solidFill>
+              <a:effectLst/>
+              <a:latin typeface="FreightSans Pro Book" panose="02000606030000020004" pitchFamily="50" charset="0"/>
+            </a:endParaRPr>
+          </a:p>
+          <a:p>
+            <a:pPr algn="l"/>
+            <a:r>
+              <a:rPr lang="en-US" sz="2000" b="1" i="0" dirty="0">
                 <a:solidFill>
                   <a:srgbClr val="003262"/>
                 </a:solidFill>
-                <a:latin typeface="FreightMicro Pro Book" panose="02000603020000020004" pitchFamily="2" charset="0"/>
-              </a:rPr>
-              <a:t> </a:t>
-            </a:r>
-            <a:r>
-              <a:rPr lang="en-US" sz="2400" dirty="0">
+                <a:effectLst/>
+                <a:latin typeface="FreightSans Pro Book" panose="02000606030000020004" pitchFamily="50" charset="0"/>
+              </a:rPr>
+              <a:t>Group Assignments: 35%</a:t>
+            </a:r>
+          </a:p>
+          <a:p>
+            <a:pPr marL="742950" lvl="1" indent="-285750" algn="l">
+              <a:buFont typeface="Arial" panose="020B0604020202020204" pitchFamily="34" charset="0"/>
+              <a:buChar char="•"/>
+            </a:pPr>
+            <a:r>
+              <a:rPr lang="en-US" sz="2000" b="0" i="0" dirty="0">
+                <a:solidFill>
+                  <a:srgbClr val="333333"/>
+                </a:solidFill>
+                <a:effectLst/>
+                <a:latin typeface="FreightSans Pro Book" panose="02000606030000020004" pitchFamily="50" charset="0"/>
+              </a:rPr>
+              <a:t>7 group coding assignments (5 points each)</a:t>
+            </a:r>
+          </a:p>
+          <a:p>
+            <a:pPr lvl="1" algn="l"/>
+            <a:endParaRPr lang="en-US" sz="2000" b="0" i="0" dirty="0">
+              <a:solidFill>
+                <a:srgbClr val="333333"/>
+              </a:solidFill>
+              <a:effectLst/>
+              <a:latin typeface="FreightSans Pro Book" panose="02000606030000020004" pitchFamily="50" charset="0"/>
+            </a:endParaRPr>
+          </a:p>
+          <a:p>
+            <a:pPr algn="l"/>
+            <a:r>
+              <a:rPr lang="en-US" sz="2000" b="1" i="0" dirty="0">
                 <a:solidFill>
                   <a:srgbClr val="003262"/>
                 </a:solidFill>
-                <a:latin typeface="FreightMicro Pro Book" panose="02000603020000020004" pitchFamily="2" charset="0"/>
-              </a:rPr>
-              <a:t>– </a:t>
-            </a:r>
-            <a:r>
-              <a:rPr lang="en-US" sz="2400" dirty="0">
-                <a:latin typeface="FreightSans Pro Book" panose="02000606030000020004" pitchFamily="2" charset="0"/>
-              </a:rPr>
-              <a:t>Your homepage for the course. Has links to text lessons and assignments.</a:t>
-            </a:r>
-          </a:p>
-          <a:p>
-            <a:endParaRPr lang="en-US" sz="2400" dirty="0">
-              <a:latin typeface="FreightSans Pro Book" panose="02000606030000020004" pitchFamily="2" charset="0"/>
+                <a:effectLst/>
+                <a:latin typeface="FreightSans Pro Book" panose="02000606030000020004" pitchFamily="50" charset="0"/>
+              </a:rPr>
+              <a:t>Participation and Code Review: 10%</a:t>
+            </a:r>
+          </a:p>
+          <a:p>
+            <a:pPr marL="742950" lvl="1" indent="-285750" algn="l">
+              <a:buFont typeface="Arial" panose="020B0604020202020204" pitchFamily="34" charset="0"/>
+              <a:buChar char="•"/>
+            </a:pPr>
+            <a:r>
+              <a:rPr lang="en-US" sz="2000" b="0" i="0" dirty="0">
+                <a:solidFill>
+                  <a:srgbClr val="333333"/>
+                </a:solidFill>
+                <a:effectLst/>
+                <a:latin typeface="FreightSans Pro Book" panose="02000606030000020004" pitchFamily="50" charset="0"/>
+              </a:rPr>
+              <a:t>Review group pull requests</a:t>
+            </a:r>
+          </a:p>
+          <a:p>
+            <a:pPr lvl="1" algn="l"/>
+            <a:endParaRPr lang="en-US" sz="2000" b="0" i="0" dirty="0">
+              <a:solidFill>
+                <a:srgbClr val="333333"/>
+              </a:solidFill>
+              <a:effectLst/>
+              <a:latin typeface="FreightSans Pro Book" panose="02000606030000020004" pitchFamily="50" charset="0"/>
             </a:endParaRPr>
           </a:p>
           <a:p>
-            <a:r>
-              <a:rPr lang="en-US" sz="2400" b="1" dirty="0">
+            <a:pPr algn="l"/>
+            <a:r>
+              <a:rPr lang="en-US" sz="2000" b="1" i="0" dirty="0">
                 <a:solidFill>
                   <a:srgbClr val="003262"/>
                 </a:solidFill>
-                <a:latin typeface="FreightMicro Pro Book" panose="02000603020000020004" pitchFamily="2" charset="0"/>
-              </a:rPr>
-              <a:t>GitHub </a:t>
-            </a:r>
-            <a:r>
-              <a:rPr lang="en-US" sz="2400" dirty="0">
-                <a:solidFill>
-                  <a:srgbClr val="003262"/>
-                </a:solidFill>
-                <a:latin typeface="FreightMicro Pro Book" panose="02000603020000020004" pitchFamily="2" charset="0"/>
-              </a:rPr>
-              <a:t>– </a:t>
-            </a:r>
-            <a:r>
-              <a:rPr lang="en-US" sz="2400" dirty="0">
-                <a:latin typeface="FreightSans Pro Book" panose="02000606030000020004" pitchFamily="2" charset="0"/>
-              </a:rPr>
-              <a:t>Assignments will be put here. Will also be used for peer code review and discussion.</a:t>
-            </a:r>
-          </a:p>
-          <a:p>
-            <a:endParaRPr lang="en-US" sz="2400" dirty="0">
-              <a:latin typeface="FreightSans Pro Book" panose="02000606030000020004" pitchFamily="2" charset="0"/>
+                <a:effectLst/>
+                <a:latin typeface="FreightSans Pro Book" panose="02000606030000020004" pitchFamily="50" charset="0"/>
+              </a:rPr>
+              <a:t>Final project &amp; presentation: 15%</a:t>
+            </a:r>
+          </a:p>
+          <a:p>
+            <a:endParaRPr lang="en-US" b="1" dirty="0">
+              <a:solidFill>
+                <a:srgbClr val="003262"/>
+              </a:solidFill>
+              <a:latin typeface="FreightMicro Pro Book" panose="02000603020000020004" pitchFamily="2" charset="0"/>
             </a:endParaRPr>
-          </a:p>
-          <a:p>
-            <a:r>
-              <a:rPr lang="en-US" sz="2400" b="1" dirty="0">
-                <a:solidFill>
-                  <a:srgbClr val="003262"/>
-                </a:solidFill>
-                <a:latin typeface="FreightMicro Pro Book" panose="02000603020000020004" pitchFamily="2" charset="0"/>
-              </a:rPr>
-              <a:t>Slack </a:t>
-            </a:r>
-            <a:r>
-              <a:rPr lang="en-US" sz="2400" dirty="0">
-                <a:latin typeface="FreightSans Pro Book" panose="02000606030000020004" pitchFamily="2" charset="0"/>
-              </a:rPr>
-              <a:t>– Can be used for discussion with your group or classmates. Can be used for social discussion as well!</a:t>
-            </a:r>
           </a:p>
         </p:txBody>
       </p:sp>
     </p:spTree>
     <p:extLst>
       <p:ext uri="{BB962C8B-B14F-4D97-AF65-F5344CB8AC3E}">
-        <p14:creationId xmlns:p14="http://schemas.microsoft.com/office/powerpoint/2010/main" val="3409060824"/>
+        <p14:creationId xmlns:p14="http://schemas.microsoft.com/office/powerpoint/2010/main" val="2833967476"/>
       </p:ext>
     </p:extLst>
   </p:cSld>
@@ -7310,7 +8496,7 @@
               <a:rPr lang="en-US" sz="5400" b="1" dirty="0">
                 <a:latin typeface="FreightSans Pro Book" panose="02000606030000020004" pitchFamily="2" charset="0"/>
               </a:rPr>
-              <a:t>Class Code of Conduct</a:t>
+              <a:t>Course Communication</a:t>
             </a:r>
           </a:p>
         </p:txBody>
@@ -7329,8 +8515,8 @@
         </p:nvSpPr>
         <p:spPr>
           <a:xfrm>
-            <a:off x="2259110" y="1954879"/>
-            <a:ext cx="7582913" cy="3416320"/>
+            <a:off x="609600" y="1796808"/>
+            <a:ext cx="9232423" cy="3046988"/>
           </a:xfrm>
           <a:prstGeom prst="rect">
             <a:avLst/>
@@ -7350,110 +8536,83 @@
                 </a:solidFill>
                 <a:latin typeface="FreightMicro Pro Book" panose="02000603020000020004" pitchFamily="2" charset="0"/>
               </a:rPr>
-              <a:t>Our Pledge </a:t>
-            </a:r>
-          </a:p>
-          <a:p>
+              <a:t>Course Website </a:t>
+            </a:r>
+            <a:r>
+              <a:rPr lang="en-US" sz="2400" dirty="0">
+                <a:solidFill>
+                  <a:srgbClr val="003262"/>
+                </a:solidFill>
+                <a:latin typeface="FreightMicro Pro Book" panose="02000603020000020004" pitchFamily="2" charset="0"/>
+              </a:rPr>
+              <a:t>– </a:t>
+            </a:r>
             <a:r>
               <a:rPr lang="en-US" sz="2400" dirty="0">
                 <a:latin typeface="FreightSans Pro Book" panose="02000606030000020004" pitchFamily="2" charset="0"/>
               </a:rPr>
-              <a:t>In the interest of fostering an open and welcoming environment, we as students and instructors pledge to making participation in this course and our community a harassment-free experience for everyone, regardless of age, body size, disability, ethnicity, gender identity and expression, level of experience, nationality, personal appearance, race, religion, or sexual identity and orientation. </a:t>
-            </a:r>
-          </a:p>
-        </p:txBody>
-      </p:sp>
-      <p:sp>
-        <p:nvSpPr>
-          <p:cNvPr id="7" name="TextBox 6">
-            <a:extLst>
-              <a:ext uri="{FF2B5EF4-FFF2-40B4-BE49-F238E27FC236}">
-                <a16:creationId xmlns:a16="http://schemas.microsoft.com/office/drawing/2014/main" id="{D999A612-77AA-4845-BFBC-D71AF39558BB}"/>
-              </a:ext>
-            </a:extLst>
-          </p:cNvPr>
-          <p:cNvSpPr txBox="1"/>
-          <p:nvPr/>
-        </p:nvSpPr>
-        <p:spPr>
-          <a:xfrm>
-            <a:off x="2378948" y="6625898"/>
-            <a:ext cx="7499169" cy="253916"/>
-          </a:xfrm>
-          <a:prstGeom prst="rect">
-            <a:avLst/>
-          </a:prstGeom>
-          <a:noFill/>
-        </p:spPr>
-        <p:txBody>
-          <a:bodyPr wrap="none" rtlCol="0">
-            <a:spAutoFit/>
-          </a:bodyPr>
-          <a:lstStyle/>
-          <a:p>
-            <a:r>
-              <a:rPr lang="en-US" sz="1050" dirty="0">
+              <a:t>Your homepage for the course. Has text lessons and assignments.</a:t>
+            </a:r>
+          </a:p>
+          <a:p>
+            <a:endParaRPr lang="en-US" sz="2400" dirty="0">
+              <a:latin typeface="FreightSans Pro Book" panose="02000606030000020004" pitchFamily="2" charset="0"/>
+            </a:endParaRPr>
+          </a:p>
+          <a:p>
+            <a:r>
+              <a:rPr lang="en-US" sz="2400" b="1" dirty="0">
                 <a:solidFill>
-                  <a:schemeClr val="bg1"/>
+                  <a:srgbClr val="003262"/>
                 </a:solidFill>
                 <a:latin typeface="FreightMicro Pro Book" panose="02000603020000020004" pitchFamily="2" charset="0"/>
               </a:rPr>
-              <a:t>This Code of Conduct is adapted from the </a:t>
-            </a:r>
-            <a:r>
-              <a:rPr lang="en-US" sz="1050" dirty="0">
+              <a:t>GitHub </a:t>
+            </a:r>
+            <a:r>
+              <a:rPr lang="en-US" sz="2400" dirty="0">
                 <a:solidFill>
-                  <a:schemeClr val="bg1"/>
+                  <a:srgbClr val="003262"/>
                 </a:solidFill>
                 <a:latin typeface="FreightMicro Pro Book" panose="02000603020000020004" pitchFamily="2" charset="0"/>
-                <a:hlinkClick r:id="rId4">
-                  <a:extLst>
-                    <a:ext uri="{A12FA001-AC4F-418D-AE19-62706E023703}">
-                      <ahyp:hlinkClr xmlns:ahyp="http://schemas.microsoft.com/office/drawing/2018/hyperlinkcolor" val="tx"/>
-                    </a:ext>
-                  </a:extLst>
-                </a:hlinkClick>
-              </a:rPr>
-              <a:t>Contributor Covenant</a:t>
-            </a:r>
-            <a:r>
-              <a:rPr lang="en-US" sz="1050" dirty="0">
+              </a:rPr>
+              <a:t>– </a:t>
+            </a:r>
+            <a:r>
+              <a:rPr lang="en-US" sz="2400" dirty="0">
+                <a:latin typeface="FreightSans Pro Book" panose="02000606030000020004" pitchFamily="2" charset="0"/>
+              </a:rPr>
+              <a:t>Assignments will be put here. Will also be used for peer code review and discussion.</a:t>
+            </a:r>
+          </a:p>
+          <a:p>
+            <a:endParaRPr lang="en-US" sz="2400" dirty="0">
+              <a:latin typeface="FreightSans Pro Book" panose="02000606030000020004" pitchFamily="2" charset="0"/>
+            </a:endParaRPr>
+          </a:p>
+          <a:p>
+            <a:r>
+              <a:rPr lang="en-US" sz="2400" b="1" dirty="0">
                 <a:solidFill>
-                  <a:schemeClr val="bg1"/>
+                  <a:srgbClr val="003262"/>
                 </a:solidFill>
                 <a:latin typeface="FreightMicro Pro Book" panose="02000603020000020004" pitchFamily="2" charset="0"/>
               </a:rPr>
-              <a:t>, version 1.4, available at </a:t>
-            </a:r>
-            <a:r>
-              <a:rPr lang="en-US" sz="1050" dirty="0">
-                <a:solidFill>
-                  <a:schemeClr val="bg1"/>
-                </a:solidFill>
-                <a:latin typeface="FreightMicro Pro Book" panose="02000603020000020004" pitchFamily="2" charset="0"/>
-                <a:hlinkClick r:id="rId5">
-                  <a:extLst>
-                    <a:ext uri="{A12FA001-AC4F-418D-AE19-62706E023703}">
-                      <ahyp:hlinkClr xmlns:ahyp="http://schemas.microsoft.com/office/drawing/2018/hyperlinkcolor" val="tx"/>
-                    </a:ext>
-                  </a:extLst>
-                </a:hlinkClick>
-              </a:rPr>
-              <a:t>http://contributor-covenant.org/version/1/4</a:t>
-            </a:r>
-            <a:endParaRPr lang="en-US" sz="1050" dirty="0">
-              <a:solidFill>
-                <a:schemeClr val="bg1"/>
-              </a:solidFill>
-              <a:latin typeface="FreightMicro Pro Book" panose="02000603020000020004" pitchFamily="2" charset="0"/>
-            </a:endParaRPr>
+              <a:t>Slack </a:t>
+            </a:r>
+            <a:r>
+              <a:rPr lang="en-US" sz="2400" dirty="0">
+                <a:latin typeface="FreightSans Pro Book" panose="02000606030000020004" pitchFamily="2" charset="0"/>
+              </a:rPr>
+              <a:t>– Can be used for discussion with your group or classmates. Can be used for social discussion as well!</a:t>
+            </a:r>
           </a:p>
         </p:txBody>
       </p:sp>
     </p:spTree>
     <p:extLst>
       <p:ext uri="{BB962C8B-B14F-4D97-AF65-F5344CB8AC3E}">
-        <p14:creationId xmlns:p14="http://schemas.microsoft.com/office/powerpoint/2010/main" val="270888353"/>
+        <p14:creationId xmlns:p14="http://schemas.microsoft.com/office/powerpoint/2010/main" val="3409060824"/>
       </p:ext>
     </p:extLst>
   </p:cSld>
@@ -7564,7 +8723,7 @@
               <a:rPr lang="en-US" sz="5400" b="1" dirty="0">
                 <a:latin typeface="FreightSans Pro Book" panose="02000606030000020004" pitchFamily="2" charset="0"/>
               </a:rPr>
-              <a:t>Class Code of Conduct</a:t>
+              <a:t>Course Website</a:t>
             </a:r>
           </a:p>
         </p:txBody>
@@ -7583,8 +8742,8 @@
         </p:nvSpPr>
         <p:spPr>
           <a:xfrm>
-            <a:off x="609563" y="1213989"/>
-            <a:ext cx="9232460" cy="4462760"/>
+            <a:off x="609600" y="1796808"/>
+            <a:ext cx="9232423" cy="2308324"/>
           </a:xfrm>
           <a:prstGeom prst="rect">
             <a:avLst/>
@@ -7597,271 +8756,35 @@
           </a:bodyPr>
           <a:lstStyle/>
           <a:p>
-            <a:r>
-              <a:rPr lang="en-US" b="1" dirty="0">
-                <a:solidFill>
-                  <a:srgbClr val="003262"/>
-                </a:solidFill>
-                <a:latin typeface="FreightMicro Pro Book" panose="02000603020000020004" pitchFamily="2" charset="0"/>
-              </a:rPr>
-              <a:t>Our Standards</a:t>
-            </a:r>
-          </a:p>
-          <a:p>
-            <a:endParaRPr lang="en-US" b="1" dirty="0">
-              <a:solidFill>
-                <a:srgbClr val="003262"/>
-              </a:solidFill>
-              <a:latin typeface="FreightMicro Pro Book" panose="02000603020000020004" pitchFamily="2" charset="0"/>
-            </a:endParaRPr>
-          </a:p>
-          <a:p>
-            <a:r>
-              <a:rPr lang="en-US" sz="1600" b="1" dirty="0">
-                <a:solidFill>
-                  <a:srgbClr val="C28220"/>
-                </a:solidFill>
-                <a:latin typeface="FreightMicro Pro Book" panose="02000603020000020004" pitchFamily="2" charset="0"/>
-              </a:rPr>
-              <a:t>Examples of behavior that contributes to creating a positive environment include: </a:t>
-            </a:r>
-          </a:p>
-          <a:p>
-            <a:pPr marL="285750" indent="-285750">
-              <a:buFont typeface="Arial" panose="020B0604020202020204" pitchFamily="34" charset="0"/>
-              <a:buChar char="•"/>
-            </a:pPr>
-            <a:r>
-              <a:rPr lang="en-US" dirty="0">
-                <a:latin typeface="FreightSans Pro Book" panose="02000606030000020004" pitchFamily="2" charset="0"/>
-              </a:rPr>
-              <a:t>Using welcoming and inclusive language </a:t>
-            </a:r>
-          </a:p>
-          <a:p>
-            <a:pPr marL="285750" indent="-285750">
-              <a:buFont typeface="Arial" panose="020B0604020202020204" pitchFamily="34" charset="0"/>
-              <a:buChar char="•"/>
-            </a:pPr>
-            <a:r>
-              <a:rPr lang="en-US" dirty="0">
-                <a:latin typeface="FreightSans Pro Book" panose="02000606030000020004" pitchFamily="2" charset="0"/>
-              </a:rPr>
-              <a:t>Being respectful of differing viewpoints and experiences </a:t>
-            </a:r>
-          </a:p>
-          <a:p>
-            <a:pPr marL="285750" indent="-285750">
-              <a:buFont typeface="Arial" panose="020B0604020202020204" pitchFamily="34" charset="0"/>
-              <a:buChar char="•"/>
-            </a:pPr>
-            <a:r>
-              <a:rPr lang="en-US" dirty="0">
-                <a:latin typeface="FreightSans Pro Book" panose="02000606030000020004" pitchFamily="2" charset="0"/>
-              </a:rPr>
-              <a:t>Gracefully accepting constructive criticism </a:t>
-            </a:r>
-          </a:p>
-          <a:p>
-            <a:pPr marL="285750" indent="-285750">
-              <a:buFont typeface="Arial" panose="020B0604020202020204" pitchFamily="34" charset="0"/>
-              <a:buChar char="•"/>
-            </a:pPr>
-            <a:r>
-              <a:rPr lang="en-US" dirty="0">
-                <a:latin typeface="FreightSans Pro Book" panose="02000606030000020004" pitchFamily="2" charset="0"/>
-              </a:rPr>
-              <a:t>Focusing on what is best for the community </a:t>
-            </a:r>
-          </a:p>
-          <a:p>
-            <a:pPr marL="285750" indent="-285750">
-              <a:buFont typeface="Arial" panose="020B0604020202020204" pitchFamily="34" charset="0"/>
-              <a:buChar char="•"/>
-            </a:pPr>
-            <a:r>
-              <a:rPr lang="en-US" dirty="0">
-                <a:latin typeface="FreightSans Pro Book" panose="02000606030000020004" pitchFamily="2" charset="0"/>
-              </a:rPr>
-              <a:t>Showing empathy towards other community members</a:t>
-            </a:r>
-          </a:p>
-          <a:p>
-            <a:pPr marL="285750" indent="-285750">
-              <a:buFont typeface="Arial" panose="020B0604020202020204" pitchFamily="34" charset="0"/>
-              <a:buChar char="•"/>
-            </a:pPr>
-            <a:endParaRPr lang="en-US" dirty="0">
-              <a:solidFill>
-                <a:srgbClr val="003262"/>
-              </a:solidFill>
+            <a:endParaRPr lang="en-US" sz="3600" dirty="0">
               <a:latin typeface="FreightSans Pro Book" panose="02000606030000020004" pitchFamily="2" charset="0"/>
             </a:endParaRPr>
           </a:p>
           <a:p>
-            <a:r>
-              <a:rPr lang="en-US" sz="1600" b="1" dirty="0">
-                <a:solidFill>
-                  <a:srgbClr val="C28220"/>
-                </a:solidFill>
-                <a:latin typeface="FreightMicro Pro Book" panose="02000603020000020004" pitchFamily="2" charset="0"/>
-              </a:rPr>
-              <a:t>Examples of unacceptable behavior by participants include: </a:t>
-            </a:r>
-          </a:p>
-          <a:p>
-            <a:pPr marL="285750" indent="-285750">
-              <a:buFont typeface="Arial" panose="020B0604020202020204" pitchFamily="34" charset="0"/>
-              <a:buChar char="•"/>
-            </a:pPr>
-            <a:r>
-              <a:rPr lang="en-US" dirty="0">
+            <a:endParaRPr lang="en-US" sz="3600" dirty="0">
+              <a:latin typeface="FreightSans Pro Book" panose="02000606030000020004" pitchFamily="2" charset="0"/>
+            </a:endParaRPr>
+          </a:p>
+          <a:p>
+            <a:endParaRPr lang="en-US" sz="3600" dirty="0">
+              <a:latin typeface="FreightSans Pro Book" panose="02000606030000020004" pitchFamily="2" charset="0"/>
+            </a:endParaRPr>
+          </a:p>
+          <a:p>
+            <a:pPr algn="ctr"/>
+            <a:r>
+              <a:rPr lang="en-US" sz="3600" dirty="0">
                 <a:latin typeface="FreightSans Pro Book" panose="02000606030000020004" pitchFamily="2" charset="0"/>
               </a:rPr>
-              <a:t>The use of sexualized language or imagery and unwelcome sexual attention or advances </a:t>
-            </a:r>
-          </a:p>
-          <a:p>
-            <a:pPr marL="285750" indent="-285750">
-              <a:buFont typeface="Arial" panose="020B0604020202020204" pitchFamily="34" charset="0"/>
-              <a:buChar char="•"/>
-            </a:pPr>
-            <a:r>
-              <a:rPr lang="en-US" dirty="0">
-                <a:latin typeface="FreightSans Pro Book" panose="02000606030000020004" pitchFamily="2" charset="0"/>
-              </a:rPr>
-              <a:t>Trolling, insulting/derogatory comments, and personal or political attacks</a:t>
-            </a:r>
-          </a:p>
-          <a:p>
-            <a:pPr marL="285750" indent="-285750">
-              <a:buFont typeface="Arial" panose="020B0604020202020204" pitchFamily="34" charset="0"/>
-              <a:buChar char="•"/>
-            </a:pPr>
-            <a:r>
-              <a:rPr lang="en-US" dirty="0">
-                <a:latin typeface="FreightSans Pro Book" panose="02000606030000020004" pitchFamily="2" charset="0"/>
-              </a:rPr>
-              <a:t>Public or private harassment </a:t>
-            </a:r>
-          </a:p>
-          <a:p>
-            <a:pPr marL="285750" indent="-285750">
-              <a:buFont typeface="Arial" panose="020B0604020202020204" pitchFamily="34" charset="0"/>
-              <a:buChar char="•"/>
-            </a:pPr>
-            <a:r>
-              <a:rPr lang="en-US" dirty="0">
-                <a:latin typeface="FreightSans Pro Book" panose="02000606030000020004" pitchFamily="2" charset="0"/>
-              </a:rPr>
-              <a:t>Publishing others' private information, such as a physical or electronic address, without explicit permission </a:t>
-            </a:r>
-          </a:p>
-          <a:p>
-            <a:pPr marL="285750" indent="-285750">
-              <a:buFont typeface="Arial" panose="020B0604020202020204" pitchFamily="34" charset="0"/>
-              <a:buChar char="•"/>
-            </a:pPr>
-            <a:r>
-              <a:rPr lang="en-US" dirty="0">
-                <a:latin typeface="FreightSans Pro Book" panose="02000606030000020004" pitchFamily="2" charset="0"/>
-              </a:rPr>
-              <a:t>Other conduct which could reasonably be considered inappropriate in a professional setting</a:t>
-            </a:r>
-          </a:p>
-        </p:txBody>
-      </p:sp>
-      <p:sp>
-        <p:nvSpPr>
-          <p:cNvPr id="6" name="TextBox 5">
-            <a:extLst>
-              <a:ext uri="{FF2B5EF4-FFF2-40B4-BE49-F238E27FC236}">
-                <a16:creationId xmlns:a16="http://schemas.microsoft.com/office/drawing/2014/main" id="{CB17A27A-E613-CA42-9769-DDEDADD77256}"/>
-              </a:ext>
-            </a:extLst>
-          </p:cNvPr>
-          <p:cNvSpPr txBox="1"/>
-          <p:nvPr/>
-        </p:nvSpPr>
-        <p:spPr>
-          <a:xfrm>
-            <a:off x="2378948" y="6625898"/>
-            <a:ext cx="7499169" cy="253916"/>
-          </a:xfrm>
-          <a:prstGeom prst="rect">
-            <a:avLst/>
-          </a:prstGeom>
-          <a:noFill/>
-        </p:spPr>
-        <p:txBody>
-          <a:bodyPr wrap="none" rtlCol="0">
-            <a:spAutoFit/>
-          </a:bodyPr>
-          <a:lstStyle/>
-          <a:p>
-            <a:r>
-              <a:rPr lang="en-US" sz="1050" dirty="0">
-                <a:solidFill>
-                  <a:schemeClr val="bg1"/>
-                </a:solidFill>
-                <a:latin typeface="FreightMicro Pro Book" panose="02000603020000020004" pitchFamily="2" charset="0"/>
-              </a:rPr>
-              <a:t>This Code of Conduct is adapted from the </a:t>
-            </a:r>
-            <a:r>
-              <a:rPr lang="en-US" sz="1050" dirty="0">
-                <a:solidFill>
-                  <a:schemeClr val="bg1"/>
-                </a:solidFill>
-                <a:latin typeface="FreightMicro Pro Book" panose="02000603020000020004" pitchFamily="2" charset="0"/>
-                <a:hlinkClick r:id="rId4">
-                  <a:extLst>
-                    <a:ext uri="{A12FA001-AC4F-418D-AE19-62706E023703}">
-                      <ahyp:hlinkClr xmlns:ahyp="http://schemas.microsoft.com/office/drawing/2018/hyperlinkcolor" val="tx"/>
-                    </a:ext>
-                  </a:extLst>
-                </a:hlinkClick>
-              </a:rPr>
-              <a:t>Contributor Covenant</a:t>
-            </a:r>
-            <a:r>
-              <a:rPr lang="en-US" sz="1050" dirty="0">
-                <a:solidFill>
-                  <a:schemeClr val="bg1"/>
-                </a:solidFill>
-                <a:latin typeface="FreightMicro Pro Book" panose="02000603020000020004" pitchFamily="2" charset="0"/>
-              </a:rPr>
-              <a:t>, version 1.4, available at </a:t>
-            </a:r>
-            <a:r>
-              <a:rPr lang="en-US" sz="1050" dirty="0">
-                <a:solidFill>
-                  <a:schemeClr val="bg1"/>
-                </a:solidFill>
-                <a:latin typeface="FreightMicro Pro Book" panose="02000603020000020004" pitchFamily="2" charset="0"/>
-                <a:hlinkClick r:id="rId5">
-                  <a:extLst>
-                    <a:ext uri="{A12FA001-AC4F-418D-AE19-62706E023703}">
-                      <ahyp:hlinkClr xmlns:ahyp="http://schemas.microsoft.com/office/drawing/2018/hyperlinkcolor" val="tx"/>
-                    </a:ext>
-                  </a:extLst>
-                </a:hlinkClick>
-              </a:rPr>
-              <a:t>http://contributor-covenant.org/version/1/4</a:t>
-            </a:r>
-            <a:endParaRPr lang="en-US" sz="1050" dirty="0">
-              <a:solidFill>
-                <a:schemeClr val="bg1"/>
-              </a:solidFill>
-              <a:latin typeface="FreightMicro Pro Book" panose="02000603020000020004" pitchFamily="2" charset="0"/>
-            </a:endParaRPr>
+              <a:t>https://msse-2022-bootcamp.github.io/lessons/</a:t>
+            </a:r>
           </a:p>
         </p:txBody>
       </p:sp>
     </p:spTree>
     <p:extLst>
       <p:ext uri="{BB962C8B-B14F-4D97-AF65-F5344CB8AC3E}">
-        <p14:creationId xmlns:p14="http://schemas.microsoft.com/office/powerpoint/2010/main" val="2367710415"/>
+        <p14:creationId xmlns:p14="http://schemas.microsoft.com/office/powerpoint/2010/main" val="3208875992"/>
       </p:ext>
     </p:extLst>
   </p:cSld>

</xml_diff>